<commit_message>
Updated SupplData4 and trees from the Alexader's email
</commit_message>
<xml_diff>
--- a/images/aftr_trees.pptx
+++ b/images/aftr_trees.pptx
@@ -208,7 +208,7 @@
           <a:p>
             <a:fld id="{C571D33F-B151-5442-9D79-DA0A881D815F}" type="datetimeFigureOut">
               <a:rPr lang="en-US" smtClean="0"/>
-              <a:t>8/19/22</a:t>
+              <a:t>10/20/22</a:t>
             </a:fld>
             <a:endParaRPr lang="en-US"/>
           </a:p>
@@ -743,7 +743,7 @@
           <a:p>
             <a:fld id="{01197F44-DB72-474A-9754-31703E05C006}" type="datetimeFigureOut">
               <a:rPr lang="en-US" smtClean="0"/>
-              <a:t>8/19/22</a:t>
+              <a:t>10/20/22</a:t>
             </a:fld>
             <a:endParaRPr lang="en-US"/>
           </a:p>
@@ -911,7 +911,7 @@
           <a:p>
             <a:fld id="{01197F44-DB72-474A-9754-31703E05C006}" type="datetimeFigureOut">
               <a:rPr lang="en-US" smtClean="0"/>
-              <a:t>8/19/22</a:t>
+              <a:t>10/20/22</a:t>
             </a:fld>
             <a:endParaRPr lang="en-US"/>
           </a:p>
@@ -1089,7 +1089,7 @@
           <a:p>
             <a:fld id="{01197F44-DB72-474A-9754-31703E05C006}" type="datetimeFigureOut">
               <a:rPr lang="en-US" smtClean="0"/>
-              <a:t>8/19/22</a:t>
+              <a:t>10/20/22</a:t>
             </a:fld>
             <a:endParaRPr lang="en-US"/>
           </a:p>
@@ -1257,7 +1257,7 @@
           <a:p>
             <a:fld id="{01197F44-DB72-474A-9754-31703E05C006}" type="datetimeFigureOut">
               <a:rPr lang="en-US" smtClean="0"/>
-              <a:t>8/19/22</a:t>
+              <a:t>10/20/22</a:t>
             </a:fld>
             <a:endParaRPr lang="en-US"/>
           </a:p>
@@ -1502,7 +1502,7 @@
           <a:p>
             <a:fld id="{01197F44-DB72-474A-9754-31703E05C006}" type="datetimeFigureOut">
               <a:rPr lang="en-US" smtClean="0"/>
-              <a:t>8/19/22</a:t>
+              <a:t>10/20/22</a:t>
             </a:fld>
             <a:endParaRPr lang="en-US"/>
           </a:p>
@@ -1787,7 +1787,7 @@
           <a:p>
             <a:fld id="{01197F44-DB72-474A-9754-31703E05C006}" type="datetimeFigureOut">
               <a:rPr lang="en-US" smtClean="0"/>
-              <a:t>8/19/22</a:t>
+              <a:t>10/20/22</a:t>
             </a:fld>
             <a:endParaRPr lang="en-US"/>
           </a:p>
@@ -2206,7 +2206,7 @@
           <a:p>
             <a:fld id="{01197F44-DB72-474A-9754-31703E05C006}" type="datetimeFigureOut">
               <a:rPr lang="en-US" smtClean="0"/>
-              <a:t>8/19/22</a:t>
+              <a:t>10/20/22</a:t>
             </a:fld>
             <a:endParaRPr lang="en-US"/>
           </a:p>
@@ -2323,7 +2323,7 @@
           <a:p>
             <a:fld id="{01197F44-DB72-474A-9754-31703E05C006}" type="datetimeFigureOut">
               <a:rPr lang="en-US" smtClean="0"/>
-              <a:t>8/19/22</a:t>
+              <a:t>10/20/22</a:t>
             </a:fld>
             <a:endParaRPr lang="en-US"/>
           </a:p>
@@ -2418,7 +2418,7 @@
           <a:p>
             <a:fld id="{01197F44-DB72-474A-9754-31703E05C006}" type="datetimeFigureOut">
               <a:rPr lang="en-US" smtClean="0"/>
-              <a:t>8/19/22</a:t>
+              <a:t>10/20/22</a:t>
             </a:fld>
             <a:endParaRPr lang="en-US"/>
           </a:p>
@@ -2693,7 +2693,7 @@
           <a:p>
             <a:fld id="{01197F44-DB72-474A-9754-31703E05C006}" type="datetimeFigureOut">
               <a:rPr lang="en-US" smtClean="0"/>
-              <a:t>8/19/22</a:t>
+              <a:t>10/20/22</a:t>
             </a:fld>
             <a:endParaRPr lang="en-US"/>
           </a:p>
@@ -2945,7 +2945,7 @@
           <a:p>
             <a:fld id="{01197F44-DB72-474A-9754-31703E05C006}" type="datetimeFigureOut">
               <a:rPr lang="en-US" smtClean="0"/>
-              <a:t>8/19/22</a:t>
+              <a:t>10/20/22</a:t>
             </a:fld>
             <a:endParaRPr lang="en-US"/>
           </a:p>
@@ -3156,7 +3156,7 @@
           <a:p>
             <a:fld id="{01197F44-DB72-474A-9754-31703E05C006}" type="datetimeFigureOut">
               <a:rPr lang="en-US" smtClean="0"/>
-              <a:t>8/19/22</a:t>
+              <a:t>10/20/22</a:t>
             </a:fld>
             <a:endParaRPr lang="en-US"/>
           </a:p>
@@ -3533,10 +3533,10 @@
       </p:grpSpPr>
       <p:pic>
         <p:nvPicPr>
-          <p:cNvPr id="12" name="Picture 11">
+          <p:cNvPr id="13" name="Picture 12">
             <a:extLst>
               <a:ext uri="{FF2B5EF4-FFF2-40B4-BE49-F238E27FC236}">
-                <a16:creationId xmlns:a16="http://schemas.microsoft.com/office/drawing/2014/main" id="{E7918BBD-49D3-214F-9A68-CFE650F8AF0D}"/>
+                <a16:creationId xmlns:a16="http://schemas.microsoft.com/office/drawing/2014/main" id="{F4470CB8-385C-6144-A6A9-33F74B5D09EB}"/>
               </a:ext>
             </a:extLst>
           </p:cNvPr>
@@ -3553,20 +3553,90 @@
         </p:blipFill>
         <p:spPr>
           <a:xfrm>
-            <a:off x="3835055" y="0"/>
-            <a:ext cx="3480145" cy="9144000"/>
+            <a:off x="0" y="523220"/>
+            <a:ext cx="3480145" cy="7195926"/>
           </a:xfrm>
           <a:prstGeom prst="rect">
             <a:avLst/>
           </a:prstGeom>
         </p:spPr>
       </p:pic>
+      <p:sp>
+        <p:nvSpPr>
+          <p:cNvPr id="6" name="TextBox 5">
+            <a:extLst>
+              <a:ext uri="{FF2B5EF4-FFF2-40B4-BE49-F238E27FC236}">
+                <a16:creationId xmlns:a16="http://schemas.microsoft.com/office/drawing/2014/main" id="{20CA894F-377E-4A4C-9489-C1600ACE739B}"/>
+              </a:ext>
+            </a:extLst>
+          </p:cNvPr>
+          <p:cNvSpPr txBox="1"/>
+          <p:nvPr/>
+        </p:nvSpPr>
+        <p:spPr>
+          <a:xfrm>
+            <a:off x="185980" y="0"/>
+            <a:ext cx="805912" cy="523220"/>
+          </a:xfrm>
+          <a:prstGeom prst="rect">
+            <a:avLst/>
+          </a:prstGeom>
+          <a:noFill/>
+        </p:spPr>
+        <p:txBody>
+          <a:bodyPr wrap="square" rtlCol="0">
+            <a:spAutoFit/>
+          </a:bodyPr>
+          <a:lstStyle/>
+          <a:p>
+            <a:r>
+              <a:rPr lang="en-US" sz="2800" b="1" dirty="0"/>
+              <a:t>A</a:t>
+            </a:r>
+          </a:p>
+        </p:txBody>
+      </p:sp>
+      <p:sp>
+        <p:nvSpPr>
+          <p:cNvPr id="15" name="TextBox 14">
+            <a:extLst>
+              <a:ext uri="{FF2B5EF4-FFF2-40B4-BE49-F238E27FC236}">
+                <a16:creationId xmlns:a16="http://schemas.microsoft.com/office/drawing/2014/main" id="{5D783B46-9A72-CB40-A33F-AB39171B225D}"/>
+              </a:ext>
+            </a:extLst>
+          </p:cNvPr>
+          <p:cNvSpPr txBox="1"/>
+          <p:nvPr/>
+        </p:nvSpPr>
+        <p:spPr>
+          <a:xfrm>
+            <a:off x="3332135" y="0"/>
+            <a:ext cx="805912" cy="523220"/>
+          </a:xfrm>
+          <a:prstGeom prst="rect">
+            <a:avLst/>
+          </a:prstGeom>
+          <a:noFill/>
+        </p:spPr>
+        <p:txBody>
+          <a:bodyPr wrap="square" rtlCol="0">
+            <a:spAutoFit/>
+          </a:bodyPr>
+          <a:lstStyle/>
+          <a:p>
+            <a:r>
+              <a:rPr lang="en-US" sz="2800" b="1" dirty="0"/>
+              <a:t>B</a:t>
+            </a:r>
+          </a:p>
+        </p:txBody>
+      </p:sp>
       <p:pic>
         <p:nvPicPr>
-          <p:cNvPr id="13" name="Picture 12">
+          <p:cNvPr id="3" name="Picture 2">
             <a:extLst>
               <a:ext uri="{FF2B5EF4-FFF2-40B4-BE49-F238E27FC236}">
-                <a16:creationId xmlns:a16="http://schemas.microsoft.com/office/drawing/2014/main" id="{F4470CB8-385C-6144-A6A9-33F74B5D09EB}"/>
+                <a16:creationId xmlns:a16="http://schemas.microsoft.com/office/drawing/2014/main" id="{A37947C4-3AEE-2A4F-9E3C-B15377525672}"/>
               </a:ext>
             </a:extLst>
           </p:cNvPr>
@@ -3583,84 +3653,14 @@
         </p:blipFill>
         <p:spPr>
           <a:xfrm>
-            <a:off x="0" y="523220"/>
-            <a:ext cx="3480145" cy="7195926"/>
+            <a:off x="3735091" y="0"/>
+            <a:ext cx="3480145" cy="9144000"/>
           </a:xfrm>
           <a:prstGeom prst="rect">
             <a:avLst/>
           </a:prstGeom>
         </p:spPr>
       </p:pic>
-      <p:sp>
-        <p:nvSpPr>
-          <p:cNvPr id="6" name="TextBox 5">
-            <a:extLst>
-              <a:ext uri="{FF2B5EF4-FFF2-40B4-BE49-F238E27FC236}">
-                <a16:creationId xmlns:a16="http://schemas.microsoft.com/office/drawing/2014/main" id="{20CA894F-377E-4A4C-9489-C1600ACE739B}"/>
-              </a:ext>
-            </a:extLst>
-          </p:cNvPr>
-          <p:cNvSpPr txBox="1"/>
-          <p:nvPr/>
-        </p:nvSpPr>
-        <p:spPr>
-          <a:xfrm>
-            <a:off x="185980" y="0"/>
-            <a:ext cx="805912" cy="523220"/>
-          </a:xfrm>
-          <a:prstGeom prst="rect">
-            <a:avLst/>
-          </a:prstGeom>
-          <a:noFill/>
-        </p:spPr>
-        <p:txBody>
-          <a:bodyPr wrap="square" rtlCol="0">
-            <a:spAutoFit/>
-          </a:bodyPr>
-          <a:lstStyle/>
-          <a:p>
-            <a:r>
-              <a:rPr lang="en-US" sz="2800" b="1" dirty="0"/>
-              <a:t>A</a:t>
-            </a:r>
-          </a:p>
-        </p:txBody>
-      </p:sp>
-      <p:sp>
-        <p:nvSpPr>
-          <p:cNvPr id="15" name="TextBox 14">
-            <a:extLst>
-              <a:ext uri="{FF2B5EF4-FFF2-40B4-BE49-F238E27FC236}">
-                <a16:creationId xmlns:a16="http://schemas.microsoft.com/office/drawing/2014/main" id="{5D783B46-9A72-CB40-A33F-AB39171B225D}"/>
-              </a:ext>
-            </a:extLst>
-          </p:cNvPr>
-          <p:cNvSpPr txBox="1"/>
-          <p:nvPr/>
-        </p:nvSpPr>
-        <p:spPr>
-          <a:xfrm>
-            <a:off x="3332135" y="0"/>
-            <a:ext cx="805912" cy="523220"/>
-          </a:xfrm>
-          <a:prstGeom prst="rect">
-            <a:avLst/>
-          </a:prstGeom>
-          <a:noFill/>
-        </p:spPr>
-        <p:txBody>
-          <a:bodyPr wrap="square" rtlCol="0">
-            <a:spAutoFit/>
-          </a:bodyPr>
-          <a:lstStyle/>
-          <a:p>
-            <a:r>
-              <a:rPr lang="en-US" sz="2800" b="1" dirty="0"/>
-              <a:t>B</a:t>
-            </a:r>
-          </a:p>
-        </p:txBody>
-      </p:sp>
     </p:spTree>
     <p:extLst>
       <p:ext uri="{BB962C8B-B14F-4D97-AF65-F5344CB8AC3E}">

</xml_diff>